<commit_message>
new pics and methods
</commit_message>
<xml_diff>
--- a/Paper/Ellipse.pptx
+++ b/Paper/Ellipse.pptx
@@ -288,7 +288,7 @@
           <a:p>
             <a:fld id="{A2B0D514-A4F8-4F7B-AC71-7F5CAD3F1F59}" type="datetimeFigureOut">
               <a:rPr lang="en-US" smtClean="0"/>
-              <a:t>1/15/2013</a:t>
+              <a:t>1/16/2013</a:t>
             </a:fld>
             <a:endParaRPr lang="en-US"/>
           </a:p>
@@ -453,7 +453,7 @@
           <a:p>
             <a:fld id="{A2B0D514-A4F8-4F7B-AC71-7F5CAD3F1F59}" type="datetimeFigureOut">
               <a:rPr lang="en-US" smtClean="0"/>
-              <a:t>1/15/2013</a:t>
+              <a:t>1/16/2013</a:t>
             </a:fld>
             <a:endParaRPr lang="en-US"/>
           </a:p>
@@ -628,7 +628,7 @@
           <a:p>
             <a:fld id="{A2B0D514-A4F8-4F7B-AC71-7F5CAD3F1F59}" type="datetimeFigureOut">
               <a:rPr lang="en-US" smtClean="0"/>
-              <a:t>1/15/2013</a:t>
+              <a:t>1/16/2013</a:t>
             </a:fld>
             <a:endParaRPr lang="en-US"/>
           </a:p>
@@ -793,7 +793,7 @@
           <a:p>
             <a:fld id="{A2B0D514-A4F8-4F7B-AC71-7F5CAD3F1F59}" type="datetimeFigureOut">
               <a:rPr lang="en-US" smtClean="0"/>
-              <a:t>1/15/2013</a:t>
+              <a:t>1/16/2013</a:t>
             </a:fld>
             <a:endParaRPr lang="en-US"/>
           </a:p>
@@ -1034,7 +1034,7 @@
           <a:p>
             <a:fld id="{A2B0D514-A4F8-4F7B-AC71-7F5CAD3F1F59}" type="datetimeFigureOut">
               <a:rPr lang="en-US" smtClean="0"/>
-              <a:t>1/15/2013</a:t>
+              <a:t>1/16/2013</a:t>
             </a:fld>
             <a:endParaRPr lang="en-US"/>
           </a:p>
@@ -1317,7 +1317,7 @@
           <a:p>
             <a:fld id="{A2B0D514-A4F8-4F7B-AC71-7F5CAD3F1F59}" type="datetimeFigureOut">
               <a:rPr lang="en-US" smtClean="0"/>
-              <a:t>1/15/2013</a:t>
+              <a:t>1/16/2013</a:t>
             </a:fld>
             <a:endParaRPr lang="en-US"/>
           </a:p>
@@ -1734,7 +1734,7 @@
           <a:p>
             <a:fld id="{A2B0D514-A4F8-4F7B-AC71-7F5CAD3F1F59}" type="datetimeFigureOut">
               <a:rPr lang="en-US" smtClean="0"/>
-              <a:t>1/15/2013</a:t>
+              <a:t>1/16/2013</a:t>
             </a:fld>
             <a:endParaRPr lang="en-US"/>
           </a:p>
@@ -1847,7 +1847,7 @@
           <a:p>
             <a:fld id="{A2B0D514-A4F8-4F7B-AC71-7F5CAD3F1F59}" type="datetimeFigureOut">
               <a:rPr lang="en-US" smtClean="0"/>
-              <a:t>1/15/2013</a:t>
+              <a:t>1/16/2013</a:t>
             </a:fld>
             <a:endParaRPr lang="en-US"/>
           </a:p>
@@ -1937,7 +1937,7 @@
           <a:p>
             <a:fld id="{A2B0D514-A4F8-4F7B-AC71-7F5CAD3F1F59}" type="datetimeFigureOut">
               <a:rPr lang="en-US" smtClean="0"/>
-              <a:t>1/15/2013</a:t>
+              <a:t>1/16/2013</a:t>
             </a:fld>
             <a:endParaRPr lang="en-US"/>
           </a:p>
@@ -2209,7 +2209,7 @@
           <a:p>
             <a:fld id="{A2B0D514-A4F8-4F7B-AC71-7F5CAD3F1F59}" type="datetimeFigureOut">
               <a:rPr lang="en-US" smtClean="0"/>
-              <a:t>1/15/2013</a:t>
+              <a:t>1/16/2013</a:t>
             </a:fld>
             <a:endParaRPr lang="en-US"/>
           </a:p>
@@ -2457,7 +2457,7 @@
           <a:p>
             <a:fld id="{A2B0D514-A4F8-4F7B-AC71-7F5CAD3F1F59}" type="datetimeFigureOut">
               <a:rPr lang="en-US" smtClean="0"/>
-              <a:t>1/15/2013</a:t>
+              <a:t>1/16/2013</a:t>
             </a:fld>
             <a:endParaRPr lang="en-US"/>
           </a:p>
@@ -2665,7 +2665,7 @@
           <a:p>
             <a:fld id="{A2B0D514-A4F8-4F7B-AC71-7F5CAD3F1F59}" type="datetimeFigureOut">
               <a:rPr lang="en-US" smtClean="0"/>
-              <a:t>1/15/2013</a:t>
+              <a:t>1/16/2013</a:t>
             </a:fld>
             <a:endParaRPr lang="en-US"/>
           </a:p>
@@ -5314,6 +5314,110 @@
           </a:fontRef>
         </p:style>
       </p:cxnSp>
+      <p:sp>
+        <p:nvSpPr>
+          <p:cNvPr id="2" name="TextBox 1"/>
+          <p:cNvSpPr txBox="1"/>
+          <p:nvPr/>
+        </p:nvSpPr>
+        <p:spPr>
+          <a:xfrm>
+            <a:off x="3037706" y="2582224"/>
+            <a:ext cx="306494" cy="369332"/>
+          </a:xfrm>
+          <a:prstGeom prst="rect">
+            <a:avLst/>
+          </a:prstGeom>
+          <a:noFill/>
+        </p:spPr>
+        <p:txBody>
+          <a:bodyPr wrap="none" rtlCol="0">
+            <a:spAutoFit/>
+          </a:bodyPr>
+          <a:lstStyle/>
+          <a:p>
+            <a:r>
+              <a:rPr lang="en-US" i="1" dirty="0">
+                <a:latin typeface="Times New Roman" pitchFamily="18" charset="0"/>
+                <a:cs typeface="Times New Roman" pitchFamily="18" charset="0"/>
+              </a:rPr>
+              <a:t>p</a:t>
+            </a:r>
+          </a:p>
+        </p:txBody>
+      </p:sp>
+      <p:sp>
+        <p:nvSpPr>
+          <p:cNvPr id="56" name="TextBox 55"/>
+          <p:cNvSpPr txBox="1"/>
+          <p:nvPr/>
+        </p:nvSpPr>
+        <p:spPr>
+          <a:xfrm>
+            <a:off x="3962064" y="2169327"/>
+            <a:ext cx="325730" cy="369332"/>
+          </a:xfrm>
+          <a:prstGeom prst="rect">
+            <a:avLst/>
+          </a:prstGeom>
+          <a:noFill/>
+        </p:spPr>
+        <p:txBody>
+          <a:bodyPr wrap="none" rtlCol="0">
+            <a:spAutoFit/>
+          </a:bodyPr>
+          <a:lstStyle/>
+          <a:p>
+            <a:r>
+              <a:rPr lang="en-US" i="1" dirty="0" smtClean="0">
+                <a:latin typeface="Times New Roman" pitchFamily="18" charset="0"/>
+                <a:cs typeface="Times New Roman" pitchFamily="18" charset="0"/>
+              </a:rPr>
+              <a:t>V</a:t>
+            </a:r>
+            <a:endParaRPr lang="en-US" i="1" dirty="0">
+              <a:latin typeface="Times New Roman" pitchFamily="18" charset="0"/>
+              <a:cs typeface="Times New Roman" pitchFamily="18" charset="0"/>
+            </a:endParaRPr>
+          </a:p>
+        </p:txBody>
+      </p:sp>
+      <p:sp>
+        <p:nvSpPr>
+          <p:cNvPr id="57" name="TextBox 56"/>
+          <p:cNvSpPr txBox="1"/>
+          <p:nvPr/>
+        </p:nvSpPr>
+        <p:spPr>
+          <a:xfrm>
+            <a:off x="6754655" y="3669268"/>
+            <a:ext cx="317716" cy="369332"/>
+          </a:xfrm>
+          <a:prstGeom prst="rect">
+            <a:avLst/>
+          </a:prstGeom>
+          <a:noFill/>
+        </p:spPr>
+        <p:txBody>
+          <a:bodyPr wrap="none" rtlCol="0">
+            <a:spAutoFit/>
+          </a:bodyPr>
+          <a:lstStyle/>
+          <a:p>
+            <a:r>
+              <a:rPr lang="en-US" i="1" dirty="0" smtClean="0">
+                <a:latin typeface="Symbol" pitchFamily="18" charset="2"/>
+                <a:cs typeface="Times New Roman" pitchFamily="18" charset="0"/>
+              </a:rPr>
+              <a:t>m</a:t>
+            </a:r>
+            <a:endParaRPr lang="en-US" i="1" dirty="0">
+              <a:latin typeface="Symbol" pitchFamily="18" charset="2"/>
+              <a:cs typeface="Times New Roman" pitchFamily="18" charset="0"/>
+            </a:endParaRPr>
+          </a:p>
+        </p:txBody>
+      </p:sp>
     </p:spTree>
     <p:extLst>
       <p:ext uri="{BB962C8B-B14F-4D97-AF65-F5344CB8AC3E}">

</xml_diff>